<commit_message>
Font and Color changes
</commit_message>
<xml_diff>
--- a/presentations/Session_10_PCF_Buildpacks.pptx
+++ b/presentations/Session_10_PCF_Buildpacks.pptx
@@ -4796,7 +4796,7 @@
             <a:r>
               <a:rPr lang="en-US" sz="2800" dirty="0">
                 <a:solidFill>
-                  <a:srgbClr val="2C95DD"/>
+                  <a:schemeClr val="bg2"/>
                 </a:solidFill>
                 <a:uFillTx/>
               </a:rPr>
@@ -7915,7 +7915,7 @@
             <a:r>
               <a:rPr lang="en-US" sz="2800" dirty="0" err="1" smtClean="0">
                 <a:solidFill>
-                  <a:srgbClr val="2C95DD"/>
+                  <a:schemeClr val="bg2"/>
                 </a:solidFill>
                 <a:uFillTx/>
               </a:rPr>
@@ -7924,24 +7924,15 @@
             <a:r>
               <a:rPr lang="en-US" sz="2800" dirty="0" smtClean="0">
                 <a:solidFill>
-                  <a:srgbClr val="2C95DD"/>
+                  <a:schemeClr val="bg2"/>
                 </a:solidFill>
                 <a:uFillTx/>
               </a:rPr>
-              <a:t> </a:t>
-            </a:r>
-            <a:r>
-              <a:rPr lang="en-US" sz="2800" dirty="0" smtClean="0">
-                <a:solidFill>
-                  <a:srgbClr val="2C95DD"/>
-                </a:solidFill>
-                <a:uFillTx/>
-              </a:rPr>
-              <a:t>Flavors</a:t>
+              <a:t> Flavors</a:t>
             </a:r>
             <a:endParaRPr lang="en-US" sz="2800" dirty="0">
               <a:solidFill>
-                <a:srgbClr val="2C95DD"/>
+                <a:schemeClr val="bg2"/>
               </a:solidFill>
               <a:uFillTx/>
             </a:endParaRPr>
@@ -7958,8 +7949,8 @@
         </p:nvSpPr>
         <p:spPr bwMode="gray">
           <a:xfrm>
-            <a:off x="366714" y="2103963"/>
-            <a:ext cx="2986085" cy="1127360"/>
+            <a:off x="366714" y="2103962"/>
+            <a:ext cx="2986085" cy="1458787"/>
           </a:xfrm>
           <a:prstGeom prst="rect">
             <a:avLst/>
@@ -8168,8 +8159,29 @@
                   <a:srgbClr val="FFFFFF"/>
                 </a:solidFill>
               </a:rPr>
-              <a:t>Binary</a:t>
+              <a:t>Binary (</a:t>
             </a:r>
+            <a:r>
+              <a:rPr lang="en-US" sz="1800" dirty="0" err="1" smtClean="0">
+                <a:solidFill>
+                  <a:srgbClr val="FFFFFF"/>
+                </a:solidFill>
+              </a:rPr>
+              <a:t>e.g</a:t>
+            </a:r>
+            <a:r>
+              <a:rPr lang="en-US" sz="1800" dirty="0" smtClean="0">
+                <a:solidFill>
+                  <a:srgbClr val="FFFFFF"/>
+                </a:solidFill>
+              </a:rPr>
+              <a:t> .NET)</a:t>
+            </a:r>
+            <a:endParaRPr lang="en-US" sz="1800" dirty="0" smtClean="0">
+              <a:solidFill>
+                <a:srgbClr val="FFFFFF"/>
+              </a:solidFill>
+            </a:endParaRPr>
           </a:p>
         </p:txBody>
       </p:sp>

</xml_diff>